<commit_message>
Added Postgres as an additional persistency layer (as well as some cosmetic changes to the app UI)
</commit_message>
<xml_diff>
--- a/yelb-architecture.pptx
+++ b/yelb-architecture.pptx
@@ -104,6 +104,11 @@
       </a:defRPr>
     </a:lvl9pPr>
   </p:defaultTextStyle>
+  <p:extLst>
+    <p:ext uri="{EFAFB233-063F-42B5-8137-9DF3F51BA10A}">
+      <p15:sldGuideLst xmlns:p15="http://schemas.microsoft.com/office/powerpoint/2012/main"/>
+    </p:ext>
+  </p:extLst>
 </p:presentation>
 </file>
 
@@ -238,9 +243,9 @@
           <a:p>
             <a:fld id="{919FEB60-5DE5-5248-904E-A9BB651676DE}" type="datetimeFigureOut">
               <a:rPr lang="en-US" smtClean="0"/>
-              <a:t>7/20/17</a:t>
+              <a:t>10/31/17</a:t>
             </a:fld>
-            <a:endParaRPr lang="en-US"/>
+            <a:endParaRPr lang="en-US" dirty="0"/>
           </a:p>
         </p:txBody>
       </p:sp>
@@ -259,7 +264,7 @@
           <a:bodyPr/>
           <a:lstStyle/>
           <a:p>
-            <a:endParaRPr lang="en-US"/>
+            <a:endParaRPr lang="en-US" dirty="0"/>
           </a:p>
         </p:txBody>
       </p:sp>
@@ -282,7 +287,7 @@
               <a:rPr lang="en-US" smtClean="0"/>
               <a:t>‹#›</a:t>
             </a:fld>
-            <a:endParaRPr lang="en-US"/>
+            <a:endParaRPr lang="en-US" dirty="0"/>
           </a:p>
         </p:txBody>
       </p:sp>
@@ -408,9 +413,9 @@
           <a:p>
             <a:fld id="{919FEB60-5DE5-5248-904E-A9BB651676DE}" type="datetimeFigureOut">
               <a:rPr lang="en-US" smtClean="0"/>
-              <a:t>7/20/17</a:t>
+              <a:t>10/31/17</a:t>
             </a:fld>
-            <a:endParaRPr lang="en-US"/>
+            <a:endParaRPr lang="en-US" dirty="0"/>
           </a:p>
         </p:txBody>
       </p:sp>
@@ -429,7 +434,7 @@
           <a:bodyPr/>
           <a:lstStyle/>
           <a:p>
-            <a:endParaRPr lang="en-US"/>
+            <a:endParaRPr lang="en-US" dirty="0"/>
           </a:p>
         </p:txBody>
       </p:sp>
@@ -452,7 +457,7 @@
               <a:rPr lang="en-US" smtClean="0"/>
               <a:t>‹#›</a:t>
             </a:fld>
-            <a:endParaRPr lang="en-US"/>
+            <a:endParaRPr lang="en-US" dirty="0"/>
           </a:p>
         </p:txBody>
       </p:sp>
@@ -588,9 +593,9 @@
           <a:p>
             <a:fld id="{919FEB60-5DE5-5248-904E-A9BB651676DE}" type="datetimeFigureOut">
               <a:rPr lang="en-US" smtClean="0"/>
-              <a:t>7/20/17</a:t>
+              <a:t>10/31/17</a:t>
             </a:fld>
-            <a:endParaRPr lang="en-US"/>
+            <a:endParaRPr lang="en-US" dirty="0"/>
           </a:p>
         </p:txBody>
       </p:sp>
@@ -609,7 +614,7 @@
           <a:bodyPr/>
           <a:lstStyle/>
           <a:p>
-            <a:endParaRPr lang="en-US"/>
+            <a:endParaRPr lang="en-US" dirty="0"/>
           </a:p>
         </p:txBody>
       </p:sp>
@@ -632,7 +637,7 @@
               <a:rPr lang="en-US" smtClean="0"/>
               <a:t>‹#›</a:t>
             </a:fld>
-            <a:endParaRPr lang="en-US"/>
+            <a:endParaRPr lang="en-US" dirty="0"/>
           </a:p>
         </p:txBody>
       </p:sp>
@@ -758,9 +763,9 @@
           <a:p>
             <a:fld id="{919FEB60-5DE5-5248-904E-A9BB651676DE}" type="datetimeFigureOut">
               <a:rPr lang="en-US" smtClean="0"/>
-              <a:t>7/20/17</a:t>
+              <a:t>10/31/17</a:t>
             </a:fld>
-            <a:endParaRPr lang="en-US"/>
+            <a:endParaRPr lang="en-US" dirty="0"/>
           </a:p>
         </p:txBody>
       </p:sp>
@@ -779,7 +784,7 @@
           <a:bodyPr/>
           <a:lstStyle/>
           <a:p>
-            <a:endParaRPr lang="en-US"/>
+            <a:endParaRPr lang="en-US" dirty="0"/>
           </a:p>
         </p:txBody>
       </p:sp>
@@ -802,7 +807,7 @@
               <a:rPr lang="en-US" smtClean="0"/>
               <a:t>‹#›</a:t>
             </a:fld>
-            <a:endParaRPr lang="en-US"/>
+            <a:endParaRPr lang="en-US" dirty="0"/>
           </a:p>
         </p:txBody>
       </p:sp>
@@ -1004,9 +1009,9 @@
           <a:p>
             <a:fld id="{919FEB60-5DE5-5248-904E-A9BB651676DE}" type="datetimeFigureOut">
               <a:rPr lang="en-US" smtClean="0"/>
-              <a:t>7/20/17</a:t>
+              <a:t>10/31/17</a:t>
             </a:fld>
-            <a:endParaRPr lang="en-US"/>
+            <a:endParaRPr lang="en-US" dirty="0"/>
           </a:p>
         </p:txBody>
       </p:sp>
@@ -1025,7 +1030,7 @@
           <a:bodyPr/>
           <a:lstStyle/>
           <a:p>
-            <a:endParaRPr lang="en-US"/>
+            <a:endParaRPr lang="en-US" dirty="0"/>
           </a:p>
         </p:txBody>
       </p:sp>
@@ -1048,7 +1053,7 @@
               <a:rPr lang="en-US" smtClean="0"/>
               <a:t>‹#›</a:t>
             </a:fld>
-            <a:endParaRPr lang="en-US"/>
+            <a:endParaRPr lang="en-US" dirty="0"/>
           </a:p>
         </p:txBody>
       </p:sp>
@@ -1236,9 +1241,9 @@
           <a:p>
             <a:fld id="{919FEB60-5DE5-5248-904E-A9BB651676DE}" type="datetimeFigureOut">
               <a:rPr lang="en-US" smtClean="0"/>
-              <a:t>7/20/17</a:t>
+              <a:t>10/31/17</a:t>
             </a:fld>
-            <a:endParaRPr lang="en-US"/>
+            <a:endParaRPr lang="en-US" dirty="0"/>
           </a:p>
         </p:txBody>
       </p:sp>
@@ -1257,7 +1262,7 @@
           <a:bodyPr/>
           <a:lstStyle/>
           <a:p>
-            <a:endParaRPr lang="en-US"/>
+            <a:endParaRPr lang="en-US" dirty="0"/>
           </a:p>
         </p:txBody>
       </p:sp>
@@ -1280,7 +1285,7 @@
               <a:rPr lang="en-US" smtClean="0"/>
               <a:t>‹#›</a:t>
             </a:fld>
-            <a:endParaRPr lang="en-US"/>
+            <a:endParaRPr lang="en-US" dirty="0"/>
           </a:p>
         </p:txBody>
       </p:sp>
@@ -1603,9 +1608,9 @@
           <a:p>
             <a:fld id="{919FEB60-5DE5-5248-904E-A9BB651676DE}" type="datetimeFigureOut">
               <a:rPr lang="en-US" smtClean="0"/>
-              <a:t>7/20/17</a:t>
+              <a:t>10/31/17</a:t>
             </a:fld>
-            <a:endParaRPr lang="en-US"/>
+            <a:endParaRPr lang="en-US" dirty="0"/>
           </a:p>
         </p:txBody>
       </p:sp>
@@ -1624,7 +1629,7 @@
           <a:bodyPr/>
           <a:lstStyle/>
           <a:p>
-            <a:endParaRPr lang="en-US"/>
+            <a:endParaRPr lang="en-US" dirty="0"/>
           </a:p>
         </p:txBody>
       </p:sp>
@@ -1647,7 +1652,7 @@
               <a:rPr lang="en-US" smtClean="0"/>
               <a:t>‹#›</a:t>
             </a:fld>
-            <a:endParaRPr lang="en-US"/>
+            <a:endParaRPr lang="en-US" dirty="0"/>
           </a:p>
         </p:txBody>
       </p:sp>
@@ -1721,9 +1726,9 @@
           <a:p>
             <a:fld id="{919FEB60-5DE5-5248-904E-A9BB651676DE}" type="datetimeFigureOut">
               <a:rPr lang="en-US" smtClean="0"/>
-              <a:t>7/20/17</a:t>
+              <a:t>10/31/17</a:t>
             </a:fld>
-            <a:endParaRPr lang="en-US"/>
+            <a:endParaRPr lang="en-US" dirty="0"/>
           </a:p>
         </p:txBody>
       </p:sp>
@@ -1742,7 +1747,7 @@
           <a:bodyPr/>
           <a:lstStyle/>
           <a:p>
-            <a:endParaRPr lang="en-US"/>
+            <a:endParaRPr lang="en-US" dirty="0"/>
           </a:p>
         </p:txBody>
       </p:sp>
@@ -1765,7 +1770,7 @@
               <a:rPr lang="en-US" smtClean="0"/>
               <a:t>‹#›</a:t>
             </a:fld>
-            <a:endParaRPr lang="en-US"/>
+            <a:endParaRPr lang="en-US" dirty="0"/>
           </a:p>
         </p:txBody>
       </p:sp>
@@ -1816,9 +1821,9 @@
           <a:p>
             <a:fld id="{919FEB60-5DE5-5248-904E-A9BB651676DE}" type="datetimeFigureOut">
               <a:rPr lang="en-US" smtClean="0"/>
-              <a:t>7/20/17</a:t>
+              <a:t>10/31/17</a:t>
             </a:fld>
-            <a:endParaRPr lang="en-US"/>
+            <a:endParaRPr lang="en-US" dirty="0"/>
           </a:p>
         </p:txBody>
       </p:sp>
@@ -1837,7 +1842,7 @@
           <a:bodyPr/>
           <a:lstStyle/>
           <a:p>
-            <a:endParaRPr lang="en-US"/>
+            <a:endParaRPr lang="en-US" dirty="0"/>
           </a:p>
         </p:txBody>
       </p:sp>
@@ -1860,7 +1865,7 @@
               <a:rPr lang="en-US" smtClean="0"/>
               <a:t>‹#›</a:t>
             </a:fld>
-            <a:endParaRPr lang="en-US"/>
+            <a:endParaRPr lang="en-US" dirty="0"/>
           </a:p>
         </p:txBody>
       </p:sp>
@@ -2093,9 +2098,9 @@
           <a:p>
             <a:fld id="{919FEB60-5DE5-5248-904E-A9BB651676DE}" type="datetimeFigureOut">
               <a:rPr lang="en-US" smtClean="0"/>
-              <a:t>7/20/17</a:t>
+              <a:t>10/31/17</a:t>
             </a:fld>
-            <a:endParaRPr lang="en-US"/>
+            <a:endParaRPr lang="en-US" dirty="0"/>
           </a:p>
         </p:txBody>
       </p:sp>
@@ -2114,7 +2119,7 @@
           <a:bodyPr/>
           <a:lstStyle/>
           <a:p>
-            <a:endParaRPr lang="en-US"/>
+            <a:endParaRPr lang="en-US" dirty="0"/>
           </a:p>
         </p:txBody>
       </p:sp>
@@ -2137,7 +2142,7 @@
               <a:rPr lang="en-US" smtClean="0"/>
               <a:t>‹#›</a:t>
             </a:fld>
-            <a:endParaRPr lang="en-US"/>
+            <a:endParaRPr lang="en-US" dirty="0"/>
           </a:p>
         </p:txBody>
       </p:sp>
@@ -2260,7 +2265,7 @@
             </a:lvl9pPr>
           </a:lstStyle>
           <a:p>
-            <a:endParaRPr lang="en-US"/>
+            <a:endParaRPr lang="en-US" dirty="0"/>
           </a:p>
         </p:txBody>
       </p:sp>
@@ -2346,9 +2351,9 @@
           <a:p>
             <a:fld id="{919FEB60-5DE5-5248-904E-A9BB651676DE}" type="datetimeFigureOut">
               <a:rPr lang="en-US" smtClean="0"/>
-              <a:t>7/20/17</a:t>
+              <a:t>10/31/17</a:t>
             </a:fld>
-            <a:endParaRPr lang="en-US"/>
+            <a:endParaRPr lang="en-US" dirty="0"/>
           </a:p>
         </p:txBody>
       </p:sp>
@@ -2367,7 +2372,7 @@
           <a:bodyPr/>
           <a:lstStyle/>
           <a:p>
-            <a:endParaRPr lang="en-US"/>
+            <a:endParaRPr lang="en-US" dirty="0"/>
           </a:p>
         </p:txBody>
       </p:sp>
@@ -2390,7 +2395,7 @@
               <a:rPr lang="en-US" smtClean="0"/>
               <a:t>‹#›</a:t>
             </a:fld>
-            <a:endParaRPr lang="en-US"/>
+            <a:endParaRPr lang="en-US" dirty="0"/>
           </a:p>
         </p:txBody>
       </p:sp>
@@ -2559,9 +2564,9 @@
           <a:p>
             <a:fld id="{919FEB60-5DE5-5248-904E-A9BB651676DE}" type="datetimeFigureOut">
               <a:rPr lang="en-US" smtClean="0"/>
-              <a:t>7/20/17</a:t>
+              <a:t>10/31/17</a:t>
             </a:fld>
-            <a:endParaRPr lang="en-US"/>
+            <a:endParaRPr lang="en-US" dirty="0"/>
           </a:p>
         </p:txBody>
       </p:sp>
@@ -2598,7 +2603,7 @@
             </a:lvl1pPr>
           </a:lstStyle>
           <a:p>
-            <a:endParaRPr lang="en-US"/>
+            <a:endParaRPr lang="en-US" dirty="0"/>
           </a:p>
         </p:txBody>
       </p:sp>
@@ -2639,7 +2644,7 @@
               <a:rPr lang="en-US" smtClean="0"/>
               <a:t>‹#›</a:t>
             </a:fld>
-            <a:endParaRPr lang="en-US"/>
+            <a:endParaRPr lang="en-US" dirty="0"/>
           </a:p>
         </p:txBody>
       </p:sp>
@@ -2972,7 +2977,7 @@
         </p:nvSpPr>
         <p:spPr>
           <a:xfrm>
-            <a:off x="3842659" y="2813957"/>
+            <a:off x="3842659" y="2629126"/>
             <a:ext cx="1905000" cy="1790700"/>
           </a:xfrm>
           <a:prstGeom prst="rect">
@@ -3072,7 +3077,7 @@
         </p:nvSpPr>
         <p:spPr>
           <a:xfrm>
-            <a:off x="6868887" y="4191000"/>
+            <a:off x="6868887" y="4006169"/>
             <a:ext cx="1926771" cy="1230085"/>
           </a:xfrm>
           <a:prstGeom prst="rect">
@@ -3150,8 +3155,8 @@
         </p:nvSpPr>
         <p:spPr>
           <a:xfrm>
-            <a:off x="4412797" y="5257804"/>
-            <a:ext cx="1700894" cy="1404258"/>
+            <a:off x="10225733" y="5019472"/>
+            <a:ext cx="1213995" cy="793499"/>
           </a:xfrm>
           <a:prstGeom prst="can">
             <a:avLst/>
@@ -3184,14 +3189,6 @@
           <a:lstStyle/>
           <a:p>
             <a:pPr algn="ctr"/>
-            <a:endParaRPr lang="en-US" b="1" i="1" dirty="0" smtClean="0">
-              <a:solidFill>
-                <a:schemeClr val="tx1"/>
-              </a:solidFill>
-            </a:endParaRPr>
-          </a:p>
-          <a:p>
-            <a:pPr algn="ctr"/>
             <a:endParaRPr lang="en-US" b="1" i="1" dirty="0">
               <a:solidFill>
                 <a:schemeClr val="tx1"/>
@@ -3206,7 +3203,15 @@
                   <a:schemeClr val="tx1"/>
                 </a:solidFill>
               </a:rPr>
-              <a:t>redis</a:t>
+              <a:t>y</a:t>
+            </a:r>
+            <a:r>
+              <a:rPr lang="en-US" b="1" i="1" dirty="0" smtClean="0">
+                <a:solidFill>
+                  <a:schemeClr val="tx1"/>
+                </a:solidFill>
+              </a:rPr>
+              <a:t>elb-cache</a:t>
             </a:r>
             <a:endParaRPr lang="en-US" b="1" i="1" dirty="0">
               <a:solidFill>
@@ -3220,15 +3225,57 @@
         <p:nvCxnSpPr>
           <p:cNvPr id="10" name="Elbow Connector 9"/>
           <p:cNvCxnSpPr>
-            <a:stCxn id="6" idx="4"/>
-            <a:endCxn id="5" idx="2"/>
+            <a:stCxn id="6" idx="2"/>
+            <a:endCxn id="5" idx="3"/>
           </p:cNvCxnSpPr>
           <p:nvPr/>
         </p:nvCxnSpPr>
         <p:spPr>
-          <a:xfrm flipV="1">
-            <a:off x="6113691" y="5421085"/>
-            <a:ext cx="1718582" cy="538848"/>
+          <a:xfrm rot="10800000">
+            <a:off x="8795659" y="4621212"/>
+            <a:ext cx="1430075" cy="795010"/>
+          </a:xfrm>
+          <a:prstGeom prst="bentConnector3">
+            <a:avLst>
+              <a:gd name="adj1" fmla="val 50000"/>
+            </a:avLst>
+          </a:prstGeom>
+          <a:ln w="19050">
+            <a:solidFill>
+              <a:schemeClr val="tx1"/>
+            </a:solidFill>
+            <a:headEnd type="triangle"/>
+            <a:tailEnd type="triangle"/>
+          </a:ln>
+        </p:spPr>
+        <p:style>
+          <a:lnRef idx="1">
+            <a:schemeClr val="accent1"/>
+          </a:lnRef>
+          <a:fillRef idx="0">
+            <a:schemeClr val="accent1"/>
+          </a:fillRef>
+          <a:effectRef idx="0">
+            <a:schemeClr val="accent1"/>
+          </a:effectRef>
+          <a:fontRef idx="minor">
+            <a:schemeClr val="tx1"/>
+          </a:fontRef>
+        </p:style>
+      </p:cxnSp>
+      <p:cxnSp>
+        <p:nvCxnSpPr>
+          <p:cNvPr id="13" name="Elbow Connector 12"/>
+          <p:cNvCxnSpPr>
+            <a:stCxn id="25" idx="3"/>
+            <a:endCxn id="5" idx="0"/>
+          </p:cNvCxnSpPr>
+          <p:nvPr/>
+        </p:nvCxnSpPr>
+        <p:spPr>
+          <a:xfrm>
+            <a:off x="5551714" y="3543532"/>
+            <a:ext cx="2280559" cy="462637"/>
           </a:xfrm>
           <a:prstGeom prst="bentConnector2">
             <a:avLst/>
@@ -3256,46 +3303,6 @@
           </a:fontRef>
         </p:style>
       </p:cxnSp>
-      <p:cxnSp>
-        <p:nvCxnSpPr>
-          <p:cNvPr id="13" name="Elbow Connector 12"/>
-          <p:cNvCxnSpPr>
-            <a:stCxn id="25" idx="3"/>
-            <a:endCxn id="24" idx="0"/>
-          </p:cNvCxnSpPr>
-          <p:nvPr/>
-        </p:nvCxnSpPr>
-        <p:spPr>
-          <a:xfrm>
-            <a:off x="5551714" y="3728363"/>
-            <a:ext cx="2286002" cy="734781"/>
-          </a:xfrm>
-          <a:prstGeom prst="bentConnector2">
-            <a:avLst/>
-          </a:prstGeom>
-          <a:ln w="19050">
-            <a:solidFill>
-              <a:schemeClr val="tx1"/>
-            </a:solidFill>
-            <a:headEnd type="triangle"/>
-            <a:tailEnd type="triangle"/>
-          </a:ln>
-        </p:spPr>
-        <p:style>
-          <a:lnRef idx="1">
-            <a:schemeClr val="accent1"/>
-          </a:lnRef>
-          <a:fillRef idx="0">
-            <a:schemeClr val="accent1"/>
-          </a:fillRef>
-          <a:effectRef idx="0">
-            <a:schemeClr val="accent1"/>
-          </a:effectRef>
-          <a:fontRef idx="minor">
-            <a:schemeClr val="tx1"/>
-          </a:fontRef>
-        </p:style>
-      </p:cxnSp>
       <p:sp>
         <p:nvSpPr>
           <p:cNvPr id="24" name="Rounded Rectangle 23"/>
@@ -3304,7 +3311,7 @@
         </p:nvSpPr>
         <p:spPr>
           <a:xfrm>
-            <a:off x="6988630" y="4463144"/>
+            <a:off x="6988630" y="4278313"/>
             <a:ext cx="1698172" cy="413657"/>
           </a:xfrm>
           <a:prstGeom prst="roundRect">
@@ -3366,7 +3373,7 @@
         </p:nvSpPr>
         <p:spPr>
           <a:xfrm>
-            <a:off x="4060371" y="3439891"/>
+            <a:off x="4060371" y="3255060"/>
             <a:ext cx="1491343" cy="576944"/>
           </a:xfrm>
           <a:prstGeom prst="roundRect">
@@ -3432,8 +3439,8 @@
         </p:nvSpPr>
         <p:spPr>
           <a:xfrm>
-            <a:off x="4144736" y="3037117"/>
-            <a:ext cx="536122" cy="359231"/>
+            <a:off x="4144736" y="2852286"/>
+            <a:ext cx="1059562" cy="359231"/>
           </a:xfrm>
           <a:prstGeom prst="snip1Rect">
             <a:avLst>
@@ -3463,10 +3470,10 @@
           <a:p>
             <a:pPr algn="ctr"/>
             <a:r>
-              <a:rPr lang="en-US" sz="1400" b="1" i="1" smtClean="0"/>
-              <a:t>UI</a:t>
-            </a:r>
-            <a:endParaRPr lang="en-US" sz="1400" b="1" i="1" dirty="0"/>
+              <a:rPr lang="en-US" sz="1100" b="1" i="1" dirty="0" smtClean="0"/>
+              <a:t>UI (Angular 2)</a:t>
+            </a:r>
+            <a:endParaRPr lang="en-US" sz="1100" b="1" i="1" dirty="0"/>
           </a:p>
         </p:txBody>
       </p:sp>
@@ -3518,14 +3525,14 @@
           <a:p>
             <a:pPr algn="ctr"/>
             <a:r>
-              <a:rPr lang="en-US" b="1" i="1" smtClean="0">
+              <a:rPr lang="en-US" b="1" i="1" dirty="0" smtClean="0">
                 <a:solidFill>
                   <a:schemeClr val="tx1"/>
                 </a:solidFill>
               </a:rPr>
               <a:t>Browser</a:t>
             </a:r>
-            <a:endParaRPr lang="en-US" b="1" i="1">
+            <a:endParaRPr lang="en-US" b="1" i="1" dirty="0">
               <a:solidFill>
                 <a:schemeClr val="tx1"/>
               </a:solidFill>
@@ -3536,15 +3543,13 @@
       <p:cxnSp>
         <p:nvCxnSpPr>
           <p:cNvPr id="35" name="Elbow Connector 34"/>
-          <p:cNvCxnSpPr>
-            <a:endCxn id="30" idx="3"/>
-          </p:cNvCxnSpPr>
+          <p:cNvCxnSpPr/>
           <p:nvPr/>
         </p:nvCxnSpPr>
         <p:spPr>
           <a:xfrm rot="5400000">
-            <a:off x="3686856" y="2043115"/>
-            <a:ext cx="1719944" cy="268061"/>
+            <a:off x="3755801" y="1910555"/>
+            <a:ext cx="1535118" cy="348349"/>
           </a:xfrm>
           <a:prstGeom prst="bentConnector3">
             <a:avLst/>
@@ -3580,8 +3585,8 @@
         </p:nvCxnSpPr>
         <p:spPr>
           <a:xfrm rot="16200000" flipH="1">
-            <a:off x="4132147" y="2214226"/>
-            <a:ext cx="2122721" cy="328612"/>
+            <a:off x="4224563" y="2121810"/>
+            <a:ext cx="1937892" cy="328610"/>
           </a:xfrm>
           <a:prstGeom prst="bentConnector3">
             <a:avLst/>
@@ -3619,13 +3624,13 @@
         </p:nvCxnSpPr>
         <p:spPr>
           <a:xfrm rot="16200000" flipH="1">
-            <a:off x="5310528" y="3487177"/>
+            <a:off x="5310528" y="3302346"/>
             <a:ext cx="288472" cy="193900"/>
           </a:xfrm>
           <a:prstGeom prst="bentConnector4">
             <a:avLst>
-              <a:gd name="adj1" fmla="val 100944"/>
-              <a:gd name="adj2" fmla="val 100000"/>
+              <a:gd name="adj1" fmla="val 97150"/>
+              <a:gd name="adj2" fmla="val 127593"/>
             </a:avLst>
           </a:prstGeom>
           <a:ln w="19050">
@@ -3776,7 +3781,7 @@
         </p:nvSpPr>
         <p:spPr>
           <a:xfrm>
-            <a:off x="6990664" y="6064026"/>
+            <a:off x="9289239" y="4128634"/>
             <a:ext cx="442913" cy="370114"/>
           </a:xfrm>
           <a:prstGeom prst="ellipse">
@@ -3834,7 +3839,7 @@
         </p:nvSpPr>
         <p:spPr>
           <a:xfrm>
-            <a:off x="6619197" y="3283406"/>
+            <a:off x="6619197" y="3098575"/>
             <a:ext cx="442913" cy="370114"/>
           </a:xfrm>
           <a:prstGeom prst="ellipse">
@@ -3869,12 +3874,306 @@
           <a:p>
             <a:pPr algn="ctr"/>
             <a:r>
-              <a:rPr lang="en-US" smtClean="0">
+              <a:rPr lang="en-US" dirty="0" smtClean="0">
                 <a:solidFill>
                   <a:schemeClr val="tx1"/>
                 </a:solidFill>
               </a:rPr>
               <a:t>3</a:t>
+            </a:r>
+            <a:endParaRPr lang="en-US" dirty="0">
+              <a:solidFill>
+                <a:schemeClr val="tx1"/>
+              </a:solidFill>
+            </a:endParaRPr>
+          </a:p>
+        </p:txBody>
+      </p:sp>
+      <p:sp>
+        <p:nvSpPr>
+          <p:cNvPr id="31" name="Can 30"/>
+          <p:cNvSpPr/>
+          <p:nvPr/>
+        </p:nvSpPr>
+        <p:spPr>
+          <a:xfrm>
+            <a:off x="5029205" y="5445408"/>
+            <a:ext cx="1541006" cy="1206218"/>
+          </a:xfrm>
+          <a:prstGeom prst="can">
+            <a:avLst/>
+          </a:prstGeom>
+          <a:noFill/>
+          <a:ln w="38100">
+            <a:solidFill>
+              <a:srgbClr val="7030A0"/>
+            </a:solidFill>
+          </a:ln>
+        </p:spPr>
+        <p:style>
+          <a:lnRef idx="2">
+            <a:schemeClr val="accent1">
+              <a:shade val="50000"/>
+            </a:schemeClr>
+          </a:lnRef>
+          <a:fillRef idx="1">
+            <a:schemeClr val="accent1"/>
+          </a:fillRef>
+          <a:effectRef idx="0">
+            <a:schemeClr val="accent1"/>
+          </a:effectRef>
+          <a:fontRef idx="minor">
+            <a:schemeClr val="lt1"/>
+          </a:fontRef>
+        </p:style>
+        <p:txBody>
+          <a:bodyPr rtlCol="0" anchor="ctr"/>
+          <a:lstStyle/>
+          <a:p>
+            <a:pPr algn="ctr"/>
+            <a:endParaRPr lang="en-US" b="1" i="1" dirty="0" smtClean="0">
+              <a:solidFill>
+                <a:schemeClr val="tx1"/>
+              </a:solidFill>
+            </a:endParaRPr>
+          </a:p>
+          <a:p>
+            <a:pPr algn="ctr"/>
+            <a:endParaRPr lang="en-US" b="1" i="1" dirty="0">
+              <a:solidFill>
+                <a:schemeClr val="tx1"/>
+              </a:solidFill>
+            </a:endParaRPr>
+          </a:p>
+          <a:p>
+            <a:pPr algn="ctr"/>
+            <a:r>
+              <a:rPr lang="en-US" b="1" i="1" dirty="0">
+                <a:solidFill>
+                  <a:schemeClr val="tx1"/>
+                </a:solidFill>
+              </a:rPr>
+              <a:t>y</a:t>
+            </a:r>
+            <a:r>
+              <a:rPr lang="en-US" b="1" i="1" dirty="0" smtClean="0">
+                <a:solidFill>
+                  <a:schemeClr val="tx1"/>
+                </a:solidFill>
+              </a:rPr>
+              <a:t>elb-db</a:t>
+            </a:r>
+            <a:endParaRPr lang="en-US" b="1" i="1" dirty="0">
+              <a:solidFill>
+                <a:schemeClr val="tx1"/>
+              </a:solidFill>
+            </a:endParaRPr>
+          </a:p>
+        </p:txBody>
+      </p:sp>
+      <p:cxnSp>
+        <p:nvCxnSpPr>
+          <p:cNvPr id="32" name="Elbow Connector 31"/>
+          <p:cNvCxnSpPr>
+            <a:stCxn id="31" idx="4"/>
+            <a:endCxn id="5" idx="2"/>
+          </p:cNvCxnSpPr>
+          <p:nvPr/>
+        </p:nvCxnSpPr>
+        <p:spPr>
+          <a:xfrm flipV="1">
+            <a:off x="6570211" y="5236254"/>
+            <a:ext cx="1262062" cy="812263"/>
+          </a:xfrm>
+          <a:prstGeom prst="bentConnector2">
+            <a:avLst/>
+          </a:prstGeom>
+          <a:ln w="19050">
+            <a:solidFill>
+              <a:schemeClr val="tx1"/>
+            </a:solidFill>
+            <a:headEnd type="triangle"/>
+            <a:tailEnd type="triangle"/>
+          </a:ln>
+        </p:spPr>
+        <p:style>
+          <a:lnRef idx="1">
+            <a:schemeClr val="accent1"/>
+          </a:lnRef>
+          <a:fillRef idx="0">
+            <a:schemeClr val="accent1"/>
+          </a:fillRef>
+          <a:effectRef idx="0">
+            <a:schemeClr val="accent1"/>
+          </a:effectRef>
+          <a:fontRef idx="minor">
+            <a:schemeClr val="tx1"/>
+          </a:fontRef>
+        </p:style>
+      </p:cxnSp>
+      <p:sp>
+        <p:nvSpPr>
+          <p:cNvPr id="39" name="Rounded Rectangle 38"/>
+          <p:cNvSpPr/>
+          <p:nvPr/>
+        </p:nvSpPr>
+        <p:spPr>
+          <a:xfrm>
+            <a:off x="10440962" y="5291845"/>
+            <a:ext cx="822450" cy="194292"/>
+          </a:xfrm>
+          <a:prstGeom prst="roundRect">
+            <a:avLst/>
+          </a:prstGeom>
+          <a:solidFill>
+            <a:srgbClr val="FF0000">
+              <a:alpha val="74000"/>
+            </a:srgbClr>
+          </a:solidFill>
+          <a:ln>
+            <a:solidFill>
+              <a:schemeClr val="accent1">
+                <a:lumMod val="60000"/>
+                <a:lumOff val="40000"/>
+              </a:schemeClr>
+            </a:solidFill>
+          </a:ln>
+        </p:spPr>
+        <p:style>
+          <a:lnRef idx="2">
+            <a:schemeClr val="accent1">
+              <a:shade val="50000"/>
+            </a:schemeClr>
+          </a:lnRef>
+          <a:fillRef idx="1">
+            <a:schemeClr val="accent1"/>
+          </a:fillRef>
+          <a:effectRef idx="0">
+            <a:schemeClr val="accent1"/>
+          </a:effectRef>
+          <a:fontRef idx="minor">
+            <a:schemeClr val="lt1"/>
+          </a:fontRef>
+        </p:style>
+        <p:txBody>
+          <a:bodyPr rtlCol="0" anchor="ctr"/>
+          <a:lstStyle/>
+          <a:p>
+            <a:pPr algn="ctr"/>
+            <a:r>
+              <a:rPr lang="en-US" b="1" i="1" dirty="0" smtClean="0"/>
+              <a:t>redis</a:t>
+            </a:r>
+            <a:endParaRPr lang="en-US" b="1" i="1" dirty="0"/>
+          </a:p>
+        </p:txBody>
+      </p:sp>
+      <p:sp>
+        <p:nvSpPr>
+          <p:cNvPr id="41" name="Rounded Rectangle 40"/>
+          <p:cNvSpPr/>
+          <p:nvPr/>
+        </p:nvSpPr>
+        <p:spPr>
+          <a:xfrm>
+            <a:off x="5097717" y="5859065"/>
+            <a:ext cx="1383562" cy="317999"/>
+          </a:xfrm>
+          <a:prstGeom prst="roundRect">
+            <a:avLst/>
+          </a:prstGeom>
+          <a:solidFill>
+            <a:srgbClr val="7030A0">
+              <a:alpha val="73000"/>
+            </a:srgbClr>
+          </a:solidFill>
+          <a:ln>
+            <a:solidFill>
+              <a:schemeClr val="accent1">
+                <a:lumMod val="60000"/>
+                <a:lumOff val="40000"/>
+              </a:schemeClr>
+            </a:solidFill>
+          </a:ln>
+        </p:spPr>
+        <p:style>
+          <a:lnRef idx="2">
+            <a:schemeClr val="accent1">
+              <a:shade val="50000"/>
+            </a:schemeClr>
+          </a:lnRef>
+          <a:fillRef idx="1">
+            <a:schemeClr val="accent1"/>
+          </a:fillRef>
+          <a:effectRef idx="0">
+            <a:schemeClr val="accent1"/>
+          </a:effectRef>
+          <a:fontRef idx="minor">
+            <a:schemeClr val="lt1"/>
+          </a:fontRef>
+        </p:style>
+        <p:txBody>
+          <a:bodyPr rtlCol="0" anchor="ctr"/>
+          <a:lstStyle/>
+          <a:p>
+            <a:pPr algn="ctr"/>
+            <a:r>
+              <a:rPr lang="en-US" b="1" i="1" dirty="0" smtClean="0"/>
+              <a:t>Postgres</a:t>
+            </a:r>
+            <a:endParaRPr lang="en-US" b="1" i="1" dirty="0"/>
+          </a:p>
+        </p:txBody>
+      </p:sp>
+      <p:sp>
+        <p:nvSpPr>
+          <p:cNvPr id="42" name="Oval 41"/>
+          <p:cNvSpPr/>
+          <p:nvPr/>
+        </p:nvSpPr>
+        <p:spPr>
+          <a:xfrm>
+            <a:off x="7201242" y="6114288"/>
+            <a:ext cx="442913" cy="370114"/>
+          </a:xfrm>
+          <a:prstGeom prst="ellipse">
+            <a:avLst/>
+          </a:prstGeom>
+          <a:noFill/>
+          <a:ln w="28575">
+            <a:solidFill>
+              <a:schemeClr val="tx1"/>
+            </a:solidFill>
+          </a:ln>
+        </p:spPr>
+        <p:style>
+          <a:lnRef idx="2">
+            <a:schemeClr val="accent1">
+              <a:shade val="50000"/>
+            </a:schemeClr>
+          </a:lnRef>
+          <a:fillRef idx="1">
+            <a:schemeClr val="accent1"/>
+          </a:fillRef>
+          <a:effectRef idx="0">
+            <a:schemeClr val="accent1"/>
+          </a:effectRef>
+          <a:fontRef idx="minor">
+            <a:schemeClr val="lt1"/>
+          </a:fontRef>
+        </p:style>
+        <p:txBody>
+          <a:bodyPr rtlCol="0" anchor="ctr"/>
+          <a:lstStyle/>
+          <a:p>
+            <a:pPr algn="ctr"/>
+            <a:r>
+              <a:rPr lang="en-US" dirty="0" smtClean="0">
+                <a:solidFill>
+                  <a:schemeClr val="tx1"/>
+                </a:solidFill>
+              </a:rPr>
+              <a:t>5</a:t>
             </a:r>
             <a:endParaRPr lang="en-US" dirty="0">
               <a:solidFill>

</xml_diff>

<commit_message>
Updated various documentation and README files. No code changes.
</commit_message>
<xml_diff>
--- a/yelb-architecture.pptx
+++ b/yelb-architecture.pptx
@@ -154,10 +154,9 @@
           </a:lstStyle>
           <a:p>
             <a:r>
-              <a:rPr lang="en-US" smtClean="0"/>
+              <a:rPr lang="en-US"/>
               <a:t>Click to edit Master title style</a:t>
             </a:r>
-            <a:endParaRPr lang="en-US"/>
           </a:p>
         </p:txBody>
       </p:sp>
@@ -219,10 +218,9 @@
           </a:lstStyle>
           <a:p>
             <a:r>
-              <a:rPr lang="en-US" smtClean="0"/>
+              <a:rPr lang="en-US"/>
               <a:t>Click to edit Master subtitle style</a:t>
             </a:r>
-            <a:endParaRPr lang="en-US"/>
           </a:p>
         </p:txBody>
       </p:sp>
@@ -243,7 +241,7 @@
           <a:p>
             <a:fld id="{919FEB60-5DE5-5248-904E-A9BB651676DE}" type="datetimeFigureOut">
               <a:rPr lang="en-US" smtClean="0"/>
-              <a:t>10/31/17</a:t>
+              <a:t>4/8/18</a:t>
             </a:fld>
             <a:endParaRPr lang="en-US" dirty="0"/>
           </a:p>
@@ -337,10 +335,9 @@
           <a:lstStyle/>
           <a:p>
             <a:r>
-              <a:rPr lang="en-US" smtClean="0"/>
+              <a:rPr lang="en-US"/>
               <a:t>Click to edit Master title style</a:t>
             </a:r>
-            <a:endParaRPr lang="en-US"/>
           </a:p>
         </p:txBody>
       </p:sp>
@@ -361,38 +358,37 @@
           <a:p>
             <a:pPr lvl="0"/>
             <a:r>
-              <a:rPr lang="en-US" smtClean="0"/>
+              <a:rPr lang="en-US"/>
               <a:t>Click to edit Master text styles</a:t>
             </a:r>
           </a:p>
           <a:p>
             <a:pPr lvl="1"/>
             <a:r>
-              <a:rPr lang="en-US" smtClean="0"/>
+              <a:rPr lang="en-US"/>
               <a:t>Second level</a:t>
             </a:r>
           </a:p>
           <a:p>
             <a:pPr lvl="2"/>
             <a:r>
-              <a:rPr lang="en-US" smtClean="0"/>
+              <a:rPr lang="en-US"/>
               <a:t>Third level</a:t>
             </a:r>
           </a:p>
           <a:p>
             <a:pPr lvl="3"/>
             <a:r>
-              <a:rPr lang="en-US" smtClean="0"/>
+              <a:rPr lang="en-US"/>
               <a:t>Fourth level</a:t>
             </a:r>
           </a:p>
           <a:p>
             <a:pPr lvl="4"/>
             <a:r>
-              <a:rPr lang="en-US" smtClean="0"/>
+              <a:rPr lang="en-US"/>
               <a:t>Fifth level</a:t>
             </a:r>
-            <a:endParaRPr lang="en-US"/>
           </a:p>
         </p:txBody>
       </p:sp>
@@ -413,7 +409,7 @@
           <a:p>
             <a:fld id="{919FEB60-5DE5-5248-904E-A9BB651676DE}" type="datetimeFigureOut">
               <a:rPr lang="en-US" smtClean="0"/>
-              <a:t>10/31/17</a:t>
+              <a:t>4/8/18</a:t>
             </a:fld>
             <a:endParaRPr lang="en-US" dirty="0"/>
           </a:p>
@@ -512,10 +508,9 @@
           <a:lstStyle/>
           <a:p>
             <a:r>
-              <a:rPr lang="en-US" smtClean="0"/>
+              <a:rPr lang="en-US"/>
               <a:t>Click to edit Master title style</a:t>
             </a:r>
-            <a:endParaRPr lang="en-US"/>
           </a:p>
         </p:txBody>
       </p:sp>
@@ -541,38 +536,37 @@
           <a:p>
             <a:pPr lvl="0"/>
             <a:r>
-              <a:rPr lang="en-US" smtClean="0"/>
+              <a:rPr lang="en-US"/>
               <a:t>Click to edit Master text styles</a:t>
             </a:r>
           </a:p>
           <a:p>
             <a:pPr lvl="1"/>
             <a:r>
-              <a:rPr lang="en-US" smtClean="0"/>
+              <a:rPr lang="en-US"/>
               <a:t>Second level</a:t>
             </a:r>
           </a:p>
           <a:p>
             <a:pPr lvl="2"/>
             <a:r>
-              <a:rPr lang="en-US" smtClean="0"/>
+              <a:rPr lang="en-US"/>
               <a:t>Third level</a:t>
             </a:r>
           </a:p>
           <a:p>
             <a:pPr lvl="3"/>
             <a:r>
-              <a:rPr lang="en-US" smtClean="0"/>
+              <a:rPr lang="en-US"/>
               <a:t>Fourth level</a:t>
             </a:r>
           </a:p>
           <a:p>
             <a:pPr lvl="4"/>
             <a:r>
-              <a:rPr lang="en-US" smtClean="0"/>
+              <a:rPr lang="en-US"/>
               <a:t>Fifth level</a:t>
             </a:r>
-            <a:endParaRPr lang="en-US"/>
           </a:p>
         </p:txBody>
       </p:sp>
@@ -593,7 +587,7 @@
           <a:p>
             <a:fld id="{919FEB60-5DE5-5248-904E-A9BB651676DE}" type="datetimeFigureOut">
               <a:rPr lang="en-US" smtClean="0"/>
-              <a:t>10/31/17</a:t>
+              <a:t>4/8/18</a:t>
             </a:fld>
             <a:endParaRPr lang="en-US" dirty="0"/>
           </a:p>
@@ -687,10 +681,9 @@
           <a:lstStyle/>
           <a:p>
             <a:r>
-              <a:rPr lang="en-US" smtClean="0"/>
+              <a:rPr lang="en-US"/>
               <a:t>Click to edit Master title style</a:t>
             </a:r>
-            <a:endParaRPr lang="en-US"/>
           </a:p>
         </p:txBody>
       </p:sp>
@@ -711,38 +704,37 @@
           <a:p>
             <a:pPr lvl="0"/>
             <a:r>
-              <a:rPr lang="en-US" smtClean="0"/>
+              <a:rPr lang="en-US"/>
               <a:t>Click to edit Master text styles</a:t>
             </a:r>
           </a:p>
           <a:p>
             <a:pPr lvl="1"/>
             <a:r>
-              <a:rPr lang="en-US" smtClean="0"/>
+              <a:rPr lang="en-US"/>
               <a:t>Second level</a:t>
             </a:r>
           </a:p>
           <a:p>
             <a:pPr lvl="2"/>
             <a:r>
-              <a:rPr lang="en-US" smtClean="0"/>
+              <a:rPr lang="en-US"/>
               <a:t>Third level</a:t>
             </a:r>
           </a:p>
           <a:p>
             <a:pPr lvl="3"/>
             <a:r>
-              <a:rPr lang="en-US" smtClean="0"/>
+              <a:rPr lang="en-US"/>
               <a:t>Fourth level</a:t>
             </a:r>
           </a:p>
           <a:p>
             <a:pPr lvl="4"/>
             <a:r>
-              <a:rPr lang="en-US" smtClean="0"/>
+              <a:rPr lang="en-US"/>
               <a:t>Fifth level</a:t>
             </a:r>
-            <a:endParaRPr lang="en-US"/>
           </a:p>
         </p:txBody>
       </p:sp>
@@ -763,7 +755,7 @@
           <a:p>
             <a:fld id="{919FEB60-5DE5-5248-904E-A9BB651676DE}" type="datetimeFigureOut">
               <a:rPr lang="en-US" smtClean="0"/>
-              <a:t>10/31/17</a:t>
+              <a:t>4/8/18</a:t>
             </a:fld>
             <a:endParaRPr lang="en-US" dirty="0"/>
           </a:p>
@@ -866,10 +858,9 @@
           </a:lstStyle>
           <a:p>
             <a:r>
-              <a:rPr lang="en-US" smtClean="0"/>
+              <a:rPr lang="en-US"/>
               <a:t>Click to edit Master title style</a:t>
             </a:r>
-            <a:endParaRPr lang="en-US"/>
           </a:p>
         </p:txBody>
       </p:sp>
@@ -986,7 +977,7 @@
           <a:p>
             <a:pPr lvl="0"/>
             <a:r>
-              <a:rPr lang="en-US" smtClean="0"/>
+              <a:rPr lang="en-US"/>
               <a:t>Click to edit Master text styles</a:t>
             </a:r>
           </a:p>
@@ -1009,7 +1000,7 @@
           <a:p>
             <a:fld id="{919FEB60-5DE5-5248-904E-A9BB651676DE}" type="datetimeFigureOut">
               <a:rPr lang="en-US" smtClean="0"/>
-              <a:t>10/31/17</a:t>
+              <a:t>4/8/18</a:t>
             </a:fld>
             <a:endParaRPr lang="en-US" dirty="0"/>
           </a:p>
@@ -1103,10 +1094,9 @@
           <a:lstStyle/>
           <a:p>
             <a:r>
-              <a:rPr lang="en-US" smtClean="0"/>
+              <a:rPr lang="en-US"/>
               <a:t>Click to edit Master title style</a:t>
             </a:r>
-            <a:endParaRPr lang="en-US"/>
           </a:p>
         </p:txBody>
       </p:sp>
@@ -1132,38 +1122,37 @@
           <a:p>
             <a:pPr lvl="0"/>
             <a:r>
-              <a:rPr lang="en-US" smtClean="0"/>
+              <a:rPr lang="en-US"/>
               <a:t>Click to edit Master text styles</a:t>
             </a:r>
           </a:p>
           <a:p>
             <a:pPr lvl="1"/>
             <a:r>
-              <a:rPr lang="en-US" smtClean="0"/>
+              <a:rPr lang="en-US"/>
               <a:t>Second level</a:t>
             </a:r>
           </a:p>
           <a:p>
             <a:pPr lvl="2"/>
             <a:r>
-              <a:rPr lang="en-US" smtClean="0"/>
+              <a:rPr lang="en-US"/>
               <a:t>Third level</a:t>
             </a:r>
           </a:p>
           <a:p>
             <a:pPr lvl="3"/>
             <a:r>
-              <a:rPr lang="en-US" smtClean="0"/>
+              <a:rPr lang="en-US"/>
               <a:t>Fourth level</a:t>
             </a:r>
           </a:p>
           <a:p>
             <a:pPr lvl="4"/>
             <a:r>
-              <a:rPr lang="en-US" smtClean="0"/>
+              <a:rPr lang="en-US"/>
               <a:t>Fifth level</a:t>
             </a:r>
-            <a:endParaRPr lang="en-US"/>
           </a:p>
         </p:txBody>
       </p:sp>
@@ -1189,38 +1178,37 @@
           <a:p>
             <a:pPr lvl="0"/>
             <a:r>
-              <a:rPr lang="en-US" smtClean="0"/>
+              <a:rPr lang="en-US"/>
               <a:t>Click to edit Master text styles</a:t>
             </a:r>
           </a:p>
           <a:p>
             <a:pPr lvl="1"/>
             <a:r>
-              <a:rPr lang="en-US" smtClean="0"/>
+              <a:rPr lang="en-US"/>
               <a:t>Second level</a:t>
             </a:r>
           </a:p>
           <a:p>
             <a:pPr lvl="2"/>
             <a:r>
-              <a:rPr lang="en-US" smtClean="0"/>
+              <a:rPr lang="en-US"/>
               <a:t>Third level</a:t>
             </a:r>
           </a:p>
           <a:p>
             <a:pPr lvl="3"/>
             <a:r>
-              <a:rPr lang="en-US" smtClean="0"/>
+              <a:rPr lang="en-US"/>
               <a:t>Fourth level</a:t>
             </a:r>
           </a:p>
           <a:p>
             <a:pPr lvl="4"/>
             <a:r>
-              <a:rPr lang="en-US" smtClean="0"/>
+              <a:rPr lang="en-US"/>
               <a:t>Fifth level</a:t>
             </a:r>
-            <a:endParaRPr lang="en-US"/>
           </a:p>
         </p:txBody>
       </p:sp>
@@ -1241,7 +1229,7 @@
           <a:p>
             <a:fld id="{919FEB60-5DE5-5248-904E-A9BB651676DE}" type="datetimeFigureOut">
               <a:rPr lang="en-US" smtClean="0"/>
-              <a:t>10/31/17</a:t>
+              <a:t>4/8/18</a:t>
             </a:fld>
             <a:endParaRPr lang="en-US" dirty="0"/>
           </a:p>
@@ -1340,10 +1328,9 @@
           <a:lstStyle/>
           <a:p>
             <a:r>
-              <a:rPr lang="en-US" smtClean="0"/>
+              <a:rPr lang="en-US"/>
               <a:t>Click to edit Master title style</a:t>
             </a:r>
-            <a:endParaRPr lang="en-US"/>
           </a:p>
         </p:txBody>
       </p:sp>
@@ -1406,7 +1393,7 @@
           <a:p>
             <a:pPr lvl="0"/>
             <a:r>
-              <a:rPr lang="en-US" smtClean="0"/>
+              <a:rPr lang="en-US"/>
               <a:t>Click to edit Master text styles</a:t>
             </a:r>
           </a:p>
@@ -1434,38 +1421,37 @@
           <a:p>
             <a:pPr lvl="0"/>
             <a:r>
-              <a:rPr lang="en-US" smtClean="0"/>
+              <a:rPr lang="en-US"/>
               <a:t>Click to edit Master text styles</a:t>
             </a:r>
           </a:p>
           <a:p>
             <a:pPr lvl="1"/>
             <a:r>
-              <a:rPr lang="en-US" smtClean="0"/>
+              <a:rPr lang="en-US"/>
               <a:t>Second level</a:t>
             </a:r>
           </a:p>
           <a:p>
             <a:pPr lvl="2"/>
             <a:r>
-              <a:rPr lang="en-US" smtClean="0"/>
+              <a:rPr lang="en-US"/>
               <a:t>Third level</a:t>
             </a:r>
           </a:p>
           <a:p>
             <a:pPr lvl="3"/>
             <a:r>
-              <a:rPr lang="en-US" smtClean="0"/>
+              <a:rPr lang="en-US"/>
               <a:t>Fourth level</a:t>
             </a:r>
           </a:p>
           <a:p>
             <a:pPr lvl="4"/>
             <a:r>
-              <a:rPr lang="en-US" smtClean="0"/>
+              <a:rPr lang="en-US"/>
               <a:t>Fifth level</a:t>
             </a:r>
-            <a:endParaRPr lang="en-US"/>
           </a:p>
         </p:txBody>
       </p:sp>
@@ -1528,7 +1514,7 @@
           <a:p>
             <a:pPr lvl="0"/>
             <a:r>
-              <a:rPr lang="en-US" smtClean="0"/>
+              <a:rPr lang="en-US"/>
               <a:t>Click to edit Master text styles</a:t>
             </a:r>
           </a:p>
@@ -1556,38 +1542,37 @@
           <a:p>
             <a:pPr lvl="0"/>
             <a:r>
-              <a:rPr lang="en-US" smtClean="0"/>
+              <a:rPr lang="en-US"/>
               <a:t>Click to edit Master text styles</a:t>
             </a:r>
           </a:p>
           <a:p>
             <a:pPr lvl="1"/>
             <a:r>
-              <a:rPr lang="en-US" smtClean="0"/>
+              <a:rPr lang="en-US"/>
               <a:t>Second level</a:t>
             </a:r>
           </a:p>
           <a:p>
             <a:pPr lvl="2"/>
             <a:r>
-              <a:rPr lang="en-US" smtClean="0"/>
+              <a:rPr lang="en-US"/>
               <a:t>Third level</a:t>
             </a:r>
           </a:p>
           <a:p>
             <a:pPr lvl="3"/>
             <a:r>
-              <a:rPr lang="en-US" smtClean="0"/>
+              <a:rPr lang="en-US"/>
               <a:t>Fourth level</a:t>
             </a:r>
           </a:p>
           <a:p>
             <a:pPr lvl="4"/>
             <a:r>
-              <a:rPr lang="en-US" smtClean="0"/>
+              <a:rPr lang="en-US"/>
               <a:t>Fifth level</a:t>
             </a:r>
-            <a:endParaRPr lang="en-US"/>
           </a:p>
         </p:txBody>
       </p:sp>
@@ -1608,7 +1593,7 @@
           <a:p>
             <a:fld id="{919FEB60-5DE5-5248-904E-A9BB651676DE}" type="datetimeFigureOut">
               <a:rPr lang="en-US" smtClean="0"/>
-              <a:t>10/31/17</a:t>
+              <a:t>4/8/18</a:t>
             </a:fld>
             <a:endParaRPr lang="en-US" dirty="0"/>
           </a:p>
@@ -1702,10 +1687,9 @@
           <a:lstStyle/>
           <a:p>
             <a:r>
-              <a:rPr lang="en-US" smtClean="0"/>
+              <a:rPr lang="en-US"/>
               <a:t>Click to edit Master title style</a:t>
             </a:r>
-            <a:endParaRPr lang="en-US"/>
           </a:p>
         </p:txBody>
       </p:sp>
@@ -1726,7 +1710,7 @@
           <a:p>
             <a:fld id="{919FEB60-5DE5-5248-904E-A9BB651676DE}" type="datetimeFigureOut">
               <a:rPr lang="en-US" smtClean="0"/>
-              <a:t>10/31/17</a:t>
+              <a:t>4/8/18</a:t>
             </a:fld>
             <a:endParaRPr lang="en-US" dirty="0"/>
           </a:p>
@@ -1821,7 +1805,7 @@
           <a:p>
             <a:fld id="{919FEB60-5DE5-5248-904E-A9BB651676DE}" type="datetimeFigureOut">
               <a:rPr lang="en-US" smtClean="0"/>
-              <a:t>10/31/17</a:t>
+              <a:t>4/8/18</a:t>
             </a:fld>
             <a:endParaRPr lang="en-US" dirty="0"/>
           </a:p>
@@ -1924,10 +1908,9 @@
           </a:lstStyle>
           <a:p>
             <a:r>
-              <a:rPr lang="en-US" smtClean="0"/>
+              <a:rPr lang="en-US"/>
               <a:t>Click to edit Master title style</a:t>
             </a:r>
-            <a:endParaRPr lang="en-US"/>
           </a:p>
         </p:txBody>
       </p:sp>
@@ -1981,38 +1964,37 @@
           <a:p>
             <a:pPr lvl="0"/>
             <a:r>
-              <a:rPr lang="en-US" smtClean="0"/>
+              <a:rPr lang="en-US"/>
               <a:t>Click to edit Master text styles</a:t>
             </a:r>
           </a:p>
           <a:p>
             <a:pPr lvl="1"/>
             <a:r>
-              <a:rPr lang="en-US" smtClean="0"/>
+              <a:rPr lang="en-US"/>
               <a:t>Second level</a:t>
             </a:r>
           </a:p>
           <a:p>
             <a:pPr lvl="2"/>
             <a:r>
-              <a:rPr lang="en-US" smtClean="0"/>
+              <a:rPr lang="en-US"/>
               <a:t>Third level</a:t>
             </a:r>
           </a:p>
           <a:p>
             <a:pPr lvl="3"/>
             <a:r>
-              <a:rPr lang="en-US" smtClean="0"/>
+              <a:rPr lang="en-US"/>
               <a:t>Fourth level</a:t>
             </a:r>
           </a:p>
           <a:p>
             <a:pPr lvl="4"/>
             <a:r>
-              <a:rPr lang="en-US" smtClean="0"/>
+              <a:rPr lang="en-US"/>
               <a:t>Fifth level</a:t>
             </a:r>
-            <a:endParaRPr lang="en-US"/>
           </a:p>
         </p:txBody>
       </p:sp>
@@ -2075,7 +2057,7 @@
           <a:p>
             <a:pPr lvl="0"/>
             <a:r>
-              <a:rPr lang="en-US" smtClean="0"/>
+              <a:rPr lang="en-US"/>
               <a:t>Click to edit Master text styles</a:t>
             </a:r>
           </a:p>
@@ -2098,7 +2080,7 @@
           <a:p>
             <a:fld id="{919FEB60-5DE5-5248-904E-A9BB651676DE}" type="datetimeFigureOut">
               <a:rPr lang="en-US" smtClean="0"/>
-              <a:t>10/31/17</a:t>
+              <a:t>4/8/18</a:t>
             </a:fld>
             <a:endParaRPr lang="en-US" dirty="0"/>
           </a:p>
@@ -2201,10 +2183,9 @@
           </a:lstStyle>
           <a:p>
             <a:r>
-              <a:rPr lang="en-US" smtClean="0"/>
+              <a:rPr lang="en-US"/>
               <a:t>Click to edit Master title style</a:t>
             </a:r>
-            <a:endParaRPr lang="en-US"/>
           </a:p>
         </p:txBody>
       </p:sp>
@@ -2328,7 +2309,7 @@
           <a:p>
             <a:pPr lvl="0"/>
             <a:r>
-              <a:rPr lang="en-US" smtClean="0"/>
+              <a:rPr lang="en-US"/>
               <a:t>Click to edit Master text styles</a:t>
             </a:r>
           </a:p>
@@ -2351,7 +2332,7 @@
           <a:p>
             <a:fld id="{919FEB60-5DE5-5248-904E-A9BB651676DE}" type="datetimeFigureOut">
               <a:rPr lang="en-US" smtClean="0"/>
-              <a:t>10/31/17</a:t>
+              <a:t>4/8/18</a:t>
             </a:fld>
             <a:endParaRPr lang="en-US" dirty="0"/>
           </a:p>
@@ -2460,10 +2441,9 @@
           <a:lstStyle/>
           <a:p>
             <a:r>
-              <a:rPr lang="en-US" smtClean="0"/>
+              <a:rPr lang="en-US"/>
               <a:t>Click to edit Master title style</a:t>
             </a:r>
-            <a:endParaRPr lang="en-US"/>
           </a:p>
         </p:txBody>
       </p:sp>
@@ -2494,38 +2474,37 @@
           <a:p>
             <a:pPr lvl="0"/>
             <a:r>
-              <a:rPr lang="en-US" smtClean="0"/>
+              <a:rPr lang="en-US"/>
               <a:t>Click to edit Master text styles</a:t>
             </a:r>
           </a:p>
           <a:p>
             <a:pPr lvl="1"/>
             <a:r>
-              <a:rPr lang="en-US" smtClean="0"/>
+              <a:rPr lang="en-US"/>
               <a:t>Second level</a:t>
             </a:r>
           </a:p>
           <a:p>
             <a:pPr lvl="2"/>
             <a:r>
-              <a:rPr lang="en-US" smtClean="0"/>
+              <a:rPr lang="en-US"/>
               <a:t>Third level</a:t>
             </a:r>
           </a:p>
           <a:p>
             <a:pPr lvl="3"/>
             <a:r>
-              <a:rPr lang="en-US" smtClean="0"/>
+              <a:rPr lang="en-US"/>
               <a:t>Fourth level</a:t>
             </a:r>
           </a:p>
           <a:p>
             <a:pPr lvl="4"/>
             <a:r>
-              <a:rPr lang="en-US" smtClean="0"/>
+              <a:rPr lang="en-US"/>
               <a:t>Fifth level</a:t>
             </a:r>
-            <a:endParaRPr lang="en-US"/>
           </a:p>
         </p:txBody>
       </p:sp>
@@ -2564,7 +2543,7 @@
           <a:p>
             <a:fld id="{919FEB60-5DE5-5248-904E-A9BB651676DE}" type="datetimeFigureOut">
               <a:rPr lang="en-US" smtClean="0"/>
-              <a:t>10/31/17</a:t>
+              <a:t>4/8/18</a:t>
             </a:fld>
             <a:endParaRPr lang="en-US" dirty="0"/>
           </a:p>
@@ -3013,7 +2992,7 @@
           <a:lstStyle/>
           <a:p>
             <a:pPr algn="ctr"/>
-            <a:endParaRPr lang="en-US" b="1" i="1" dirty="0" smtClean="0">
+            <a:endParaRPr lang="en-US" b="1" i="1" dirty="0">
               <a:solidFill>
                 <a:schemeClr val="tx1"/>
               </a:solidFill>
@@ -3029,7 +3008,7 @@
           </a:p>
           <a:p>
             <a:pPr algn="ctr"/>
-            <a:endParaRPr lang="en-US" b="1" i="1" dirty="0" smtClean="0">
+            <a:endParaRPr lang="en-US" b="1" i="1" dirty="0">
               <a:solidFill>
                 <a:schemeClr val="tx1"/>
               </a:solidFill>
@@ -3045,7 +3024,7 @@
           </a:p>
           <a:p>
             <a:pPr algn="ctr"/>
-            <a:endParaRPr lang="en-US" b="1" i="1" dirty="0" smtClean="0">
+            <a:endParaRPr lang="en-US" b="1" i="1" dirty="0">
               <a:solidFill>
                 <a:schemeClr val="tx1"/>
               </a:solidFill>
@@ -3054,18 +3033,13 @@
           <a:p>
             <a:pPr algn="ctr"/>
             <a:r>
-              <a:rPr lang="en-US" b="1" i="1" dirty="0" smtClean="0">
+              <a:rPr lang="en-US" b="1" i="1" dirty="0">
                 <a:solidFill>
                   <a:schemeClr val="tx1"/>
                 </a:solidFill>
               </a:rPr>
               <a:t>yelb-ui</a:t>
             </a:r>
-            <a:endParaRPr lang="en-US" b="1" i="1" dirty="0">
-              <a:solidFill>
-                <a:schemeClr val="tx1"/>
-              </a:solidFill>
-            </a:endParaRPr>
           </a:p>
         </p:txBody>
       </p:sp>
@@ -3107,7 +3081,7 @@
           <a:lstStyle/>
           <a:p>
             <a:pPr algn="ctr"/>
-            <a:endParaRPr lang="en-US" b="1" i="1" dirty="0" smtClean="0">
+            <a:endParaRPr lang="en-US" b="1" i="1" dirty="0">
               <a:solidFill>
                 <a:schemeClr val="tx1"/>
               </a:solidFill>
@@ -3123,7 +3097,7 @@
           </a:p>
           <a:p>
             <a:pPr algn="ctr"/>
-            <a:endParaRPr lang="en-US" b="1" i="1" dirty="0" smtClean="0">
+            <a:endParaRPr lang="en-US" b="1" i="1" dirty="0">
               <a:solidFill>
                 <a:schemeClr val="tx1"/>
               </a:solidFill>
@@ -3132,18 +3106,13 @@
           <a:p>
             <a:pPr algn="ctr"/>
             <a:r>
-              <a:rPr lang="en-US" b="1" i="1" dirty="0" smtClean="0">
+              <a:rPr lang="en-US" b="1" i="1" dirty="0">
                 <a:solidFill>
                   <a:schemeClr val="tx1"/>
                 </a:solidFill>
               </a:rPr>
               <a:t>yelb-appserver</a:t>
             </a:r>
-            <a:endParaRPr lang="en-US" b="1" i="1" dirty="0">
-              <a:solidFill>
-                <a:schemeClr val="tx1"/>
-              </a:solidFill>
-            </a:endParaRPr>
           </a:p>
         </p:txBody>
       </p:sp>
@@ -3198,26 +3167,13 @@
           <a:p>
             <a:pPr algn="ctr"/>
             <a:r>
-              <a:rPr lang="en-US" b="1" i="1" dirty="0" smtClean="0">
+              <a:rPr lang="en-US" b="1" i="1" dirty="0">
                 <a:solidFill>
                   <a:schemeClr val="tx1"/>
                 </a:solidFill>
               </a:rPr>
-              <a:t>y</a:t>
-            </a:r>
-            <a:r>
-              <a:rPr lang="en-US" b="1" i="1" dirty="0" smtClean="0">
-                <a:solidFill>
-                  <a:schemeClr val="tx1"/>
-                </a:solidFill>
-              </a:rPr>
-              <a:t>elb-cache</a:t>
-            </a:r>
-            <a:endParaRPr lang="en-US" b="1" i="1" dirty="0">
-              <a:solidFill>
-                <a:schemeClr val="tx1"/>
-              </a:solidFill>
-            </a:endParaRPr>
+              <a:t>yelb-cache</a:t>
+            </a:r>
           </a:p>
         </p:txBody>
       </p:sp>
@@ -3355,13 +3311,8 @@
             <a:pPr algn="ctr"/>
             <a:r>
               <a:rPr lang="en-US" b="1" i="1" dirty="0"/>
-              <a:t>r</a:t>
-            </a:r>
-            <a:r>
-              <a:rPr lang="en-US" b="1" i="1" dirty="0" smtClean="0"/>
-              <a:t>uby - sinatra</a:t>
-            </a:r>
-            <a:endParaRPr lang="en-US" b="1" i="1" dirty="0"/>
+              <a:t>ruby - sinatra</a:t>
+            </a:r>
           </a:p>
         </p:txBody>
       </p:sp>
@@ -3416,18 +3367,13 @@
           <a:p>
             <a:pPr algn="ctr"/>
             <a:r>
-              <a:rPr lang="en-US" b="1" i="1" dirty="0" smtClean="0">
+              <a:rPr lang="en-US" b="1" i="1" dirty="0">
                 <a:solidFill>
                   <a:schemeClr val="tx1"/>
                 </a:solidFill>
               </a:rPr>
               <a:t>nginx</a:t>
             </a:r>
-            <a:endParaRPr lang="en-US" b="1" i="1" dirty="0">
-              <a:solidFill>
-                <a:schemeClr val="tx1"/>
-              </a:solidFill>
-            </a:endParaRPr>
           </a:p>
         </p:txBody>
       </p:sp>
@@ -3470,10 +3416,9 @@
           <a:p>
             <a:pPr algn="ctr"/>
             <a:r>
-              <a:rPr lang="en-US" sz="1100" b="1" i="1" dirty="0" smtClean="0"/>
+              <a:rPr lang="en-US" sz="1100" b="1" i="1" dirty="0"/>
               <a:t>UI (Angular 2)</a:t>
             </a:r>
-            <a:endParaRPr lang="en-US" sz="1100" b="1" i="1" dirty="0"/>
           </a:p>
         </p:txBody>
       </p:sp>
@@ -3525,18 +3470,13 @@
           <a:p>
             <a:pPr algn="ctr"/>
             <a:r>
-              <a:rPr lang="en-US" b="1" i="1" dirty="0" smtClean="0">
+              <a:rPr lang="en-US" b="1" i="1" dirty="0">
                 <a:solidFill>
                   <a:schemeClr val="tx1"/>
                 </a:solidFill>
               </a:rPr>
               <a:t>Browser</a:t>
             </a:r>
-            <a:endParaRPr lang="en-US" b="1" i="1" dirty="0">
-              <a:solidFill>
-                <a:schemeClr val="tx1"/>
-              </a:solidFill>
-            </a:endParaRPr>
           </a:p>
         </p:txBody>
       </p:sp>
@@ -3700,18 +3640,13 @@
           <a:p>
             <a:pPr algn="ctr"/>
             <a:r>
-              <a:rPr lang="en-US" dirty="0" smtClean="0">
+              <a:rPr lang="en-US" dirty="0">
                 <a:solidFill>
                   <a:schemeClr val="tx1"/>
                 </a:solidFill>
               </a:rPr>
               <a:t>1</a:t>
             </a:r>
-            <a:endParaRPr lang="en-US" dirty="0">
-              <a:solidFill>
-                <a:schemeClr val="tx1"/>
-              </a:solidFill>
-            </a:endParaRPr>
           </a:p>
         </p:txBody>
       </p:sp>
@@ -3758,18 +3693,13 @@
           <a:p>
             <a:pPr algn="ctr"/>
             <a:r>
-              <a:rPr lang="en-US" dirty="0" smtClean="0">
+              <a:rPr lang="en-US" dirty="0">
                 <a:solidFill>
                   <a:schemeClr val="tx1"/>
                 </a:solidFill>
               </a:rPr>
               <a:t>2</a:t>
             </a:r>
-            <a:endParaRPr lang="en-US" dirty="0">
-              <a:solidFill>
-                <a:schemeClr val="tx1"/>
-              </a:solidFill>
-            </a:endParaRPr>
           </a:p>
         </p:txBody>
       </p:sp>
@@ -3816,18 +3746,13 @@
           <a:p>
             <a:pPr algn="ctr"/>
             <a:r>
-              <a:rPr lang="en-US" dirty="0" smtClean="0">
+              <a:rPr lang="en-US" dirty="0">
                 <a:solidFill>
                   <a:schemeClr val="tx1"/>
                 </a:solidFill>
               </a:rPr>
               <a:t>4</a:t>
             </a:r>
-            <a:endParaRPr lang="en-US" dirty="0">
-              <a:solidFill>
-                <a:schemeClr val="tx1"/>
-              </a:solidFill>
-            </a:endParaRPr>
           </a:p>
         </p:txBody>
       </p:sp>
@@ -3874,18 +3799,13 @@
           <a:p>
             <a:pPr algn="ctr"/>
             <a:r>
-              <a:rPr lang="en-US" dirty="0" smtClean="0">
+              <a:rPr lang="en-US" dirty="0">
                 <a:solidFill>
                   <a:schemeClr val="tx1"/>
                 </a:solidFill>
               </a:rPr>
               <a:t>3</a:t>
             </a:r>
-            <a:endParaRPr lang="en-US" dirty="0">
-              <a:solidFill>
-                <a:schemeClr val="tx1"/>
-              </a:solidFill>
-            </a:endParaRPr>
           </a:p>
         </p:txBody>
       </p:sp>
@@ -3931,7 +3851,7 @@
           <a:lstStyle/>
           <a:p>
             <a:pPr algn="ctr"/>
-            <a:endParaRPr lang="en-US" b="1" i="1" dirty="0" smtClean="0">
+            <a:endParaRPr lang="en-US" b="1" i="1" dirty="0">
               <a:solidFill>
                 <a:schemeClr val="tx1"/>
               </a:solidFill>
@@ -3953,21 +3873,8 @@
                   <a:schemeClr val="tx1"/>
                 </a:solidFill>
               </a:rPr>
-              <a:t>y</a:t>
-            </a:r>
-            <a:r>
-              <a:rPr lang="en-US" b="1" i="1" dirty="0" smtClean="0">
-                <a:solidFill>
-                  <a:schemeClr val="tx1"/>
-                </a:solidFill>
-              </a:rPr>
-              <a:t>elb-db</a:t>
-            </a:r>
-            <a:endParaRPr lang="en-US" b="1" i="1" dirty="0">
-              <a:solidFill>
-                <a:schemeClr val="tx1"/>
-              </a:solidFill>
-            </a:endParaRPr>
+              <a:t>yelb-db</a:t>
+            </a:r>
           </a:p>
         </p:txBody>
       </p:sp>
@@ -4061,10 +3968,9 @@
           <a:p>
             <a:pPr algn="ctr"/>
             <a:r>
-              <a:rPr lang="en-US" b="1" i="1" dirty="0" smtClean="0"/>
+              <a:rPr lang="en-US" b="1" i="1" dirty="0"/>
               <a:t>redis</a:t>
             </a:r>
-            <a:endParaRPr lang="en-US" b="1" i="1" dirty="0"/>
           </a:p>
         </p:txBody>
       </p:sp>
@@ -4118,10 +4024,9 @@
           <a:p>
             <a:pPr algn="ctr"/>
             <a:r>
-              <a:rPr lang="en-US" b="1" i="1" dirty="0" smtClean="0"/>
+              <a:rPr lang="en-US" b="1" i="1" dirty="0"/>
               <a:t>Postgres</a:t>
             </a:r>
-            <a:endParaRPr lang="en-US" b="1" i="1" dirty="0"/>
           </a:p>
         </p:txBody>
       </p:sp>
@@ -4168,18 +4073,188 @@
           <a:p>
             <a:pPr algn="ctr"/>
             <a:r>
-              <a:rPr lang="en-US" dirty="0" smtClean="0">
+              <a:rPr lang="en-US" dirty="0">
                 <a:solidFill>
                   <a:schemeClr val="tx1"/>
                 </a:solidFill>
               </a:rPr>
               <a:t>5</a:t>
             </a:r>
-            <a:endParaRPr lang="en-US" dirty="0">
-              <a:solidFill>
-                <a:schemeClr val="tx1"/>
-              </a:solidFill>
-            </a:endParaRPr>
+          </a:p>
+        </p:txBody>
+      </p:sp>
+      <p:sp>
+        <p:nvSpPr>
+          <p:cNvPr id="2" name="TextBox 1">
+            <a:extLst>
+              <a:ext uri="{FF2B5EF4-FFF2-40B4-BE49-F238E27FC236}">
+                <a16:creationId xmlns:a16="http://schemas.microsoft.com/office/drawing/2014/main" id="{C0EA594C-1274-4843-966F-191552ADC839}"/>
+              </a:ext>
+            </a:extLst>
+          </p:cNvPr>
+          <p:cNvSpPr txBox="1"/>
+          <p:nvPr/>
+        </p:nvSpPr>
+        <p:spPr>
+          <a:xfrm>
+            <a:off x="4756117" y="2332211"/>
+            <a:ext cx="683200" cy="276999"/>
+          </a:xfrm>
+          <a:prstGeom prst="rect">
+            <a:avLst/>
+          </a:prstGeom>
+          <a:noFill/>
+        </p:spPr>
+        <p:txBody>
+          <a:bodyPr wrap="none" rtlCol="0">
+            <a:spAutoFit/>
+          </a:bodyPr>
+          <a:lstStyle/>
+          <a:p>
+            <a:r>
+              <a:rPr lang="en-US" sz="1200" b="1" i="1" dirty="0"/>
+              <a:t>port 80 </a:t>
+            </a:r>
+          </a:p>
+        </p:txBody>
+      </p:sp>
+      <p:sp>
+        <p:nvSpPr>
+          <p:cNvPr id="26" name="TextBox 25">
+            <a:extLst>
+              <a:ext uri="{FF2B5EF4-FFF2-40B4-BE49-F238E27FC236}">
+                <a16:creationId xmlns:a16="http://schemas.microsoft.com/office/drawing/2014/main" id="{36FE3504-9A97-3A43-AEB6-D1F4AC9AC6A6}"/>
+              </a:ext>
+            </a:extLst>
+          </p:cNvPr>
+          <p:cNvSpPr txBox="1"/>
+          <p:nvPr/>
+        </p:nvSpPr>
+        <p:spPr>
+          <a:xfrm>
+            <a:off x="3727760" y="2330130"/>
+            <a:ext cx="683200" cy="276999"/>
+          </a:xfrm>
+          <a:prstGeom prst="rect">
+            <a:avLst/>
+          </a:prstGeom>
+          <a:noFill/>
+        </p:spPr>
+        <p:txBody>
+          <a:bodyPr wrap="none" rtlCol="0">
+            <a:spAutoFit/>
+          </a:bodyPr>
+          <a:lstStyle/>
+          <a:p>
+            <a:r>
+              <a:rPr lang="en-US" sz="1200" b="1" i="1" dirty="0"/>
+              <a:t>port 80 </a:t>
+            </a:r>
+          </a:p>
+        </p:txBody>
+      </p:sp>
+      <p:sp>
+        <p:nvSpPr>
+          <p:cNvPr id="27" name="TextBox 26">
+            <a:extLst>
+              <a:ext uri="{FF2B5EF4-FFF2-40B4-BE49-F238E27FC236}">
+                <a16:creationId xmlns:a16="http://schemas.microsoft.com/office/drawing/2014/main" id="{9B41E7E9-0B5A-FD4A-B2EC-CF394E9BA320}"/>
+              </a:ext>
+            </a:extLst>
+          </p:cNvPr>
+          <p:cNvSpPr txBox="1"/>
+          <p:nvPr/>
+        </p:nvSpPr>
+        <p:spPr>
+          <a:xfrm>
+            <a:off x="7061520" y="3680655"/>
+            <a:ext cx="840295" cy="276999"/>
+          </a:xfrm>
+          <a:prstGeom prst="rect">
+            <a:avLst/>
+          </a:prstGeom>
+          <a:noFill/>
+        </p:spPr>
+        <p:txBody>
+          <a:bodyPr wrap="none" rtlCol="0">
+            <a:spAutoFit/>
+          </a:bodyPr>
+          <a:lstStyle/>
+          <a:p>
+            <a:r>
+              <a:rPr lang="en-US" sz="1200" b="1" i="1" dirty="0"/>
+              <a:t>port 4567 </a:t>
+            </a:r>
+          </a:p>
+        </p:txBody>
+      </p:sp>
+      <p:sp>
+        <p:nvSpPr>
+          <p:cNvPr id="28" name="TextBox 27">
+            <a:extLst>
+              <a:ext uri="{FF2B5EF4-FFF2-40B4-BE49-F238E27FC236}">
+                <a16:creationId xmlns:a16="http://schemas.microsoft.com/office/drawing/2014/main" id="{BBCF5784-93E1-614D-8DDC-E1392E750019}"/>
+              </a:ext>
+            </a:extLst>
+          </p:cNvPr>
+          <p:cNvSpPr txBox="1"/>
+          <p:nvPr/>
+        </p:nvSpPr>
+        <p:spPr>
+          <a:xfrm>
+            <a:off x="6582403" y="5771518"/>
+            <a:ext cx="840295" cy="276999"/>
+          </a:xfrm>
+          <a:prstGeom prst="rect">
+            <a:avLst/>
+          </a:prstGeom>
+          <a:noFill/>
+        </p:spPr>
+        <p:txBody>
+          <a:bodyPr wrap="none" rtlCol="0">
+            <a:spAutoFit/>
+          </a:bodyPr>
+          <a:lstStyle/>
+          <a:p>
+            <a:r>
+              <a:rPr lang="en-US" sz="1200" b="1" i="1" dirty="0"/>
+              <a:t>port 5432 </a:t>
+            </a:r>
+          </a:p>
+        </p:txBody>
+      </p:sp>
+      <p:sp>
+        <p:nvSpPr>
+          <p:cNvPr id="29" name="TextBox 28">
+            <a:extLst>
+              <a:ext uri="{FF2B5EF4-FFF2-40B4-BE49-F238E27FC236}">
+                <a16:creationId xmlns:a16="http://schemas.microsoft.com/office/drawing/2014/main" id="{371D7333-BA31-394B-B1FD-CEE0284E26D7}"/>
+              </a:ext>
+            </a:extLst>
+          </p:cNvPr>
+          <p:cNvSpPr txBox="1"/>
+          <p:nvPr/>
+        </p:nvSpPr>
+        <p:spPr>
+          <a:xfrm>
+            <a:off x="9424351" y="5416221"/>
+            <a:ext cx="840295" cy="276999"/>
+          </a:xfrm>
+          <a:prstGeom prst="rect">
+            <a:avLst/>
+          </a:prstGeom>
+          <a:noFill/>
+        </p:spPr>
+        <p:txBody>
+          <a:bodyPr wrap="none" rtlCol="0">
+            <a:spAutoFit/>
+          </a:bodyPr>
+          <a:lstStyle/>
+          <a:p>
+            <a:r>
+              <a:rPr lang="en-US" sz="1200" b="1" i="1" dirty="0"/>
+              <a:t>port 6379 </a:t>
+            </a:r>
           </a:p>
         </p:txBody>
       </p:sp>

</xml_diff>